<commit_message>
push Junit&Mokito demo project
</commit_message>
<xml_diff>
--- a/Software testing/software testing.pptx
+++ b/Software testing/software testing.pptx
@@ -9,8 +9,16 @@
     <p:sldId id="257" r:id="rId3"/>
     <p:sldId id="258" r:id="rId4"/>
     <p:sldId id="259" r:id="rId5"/>
-    <p:sldId id="260" r:id="rId6"/>
-    <p:sldId id="261" r:id="rId7"/>
+    <p:sldId id="263" r:id="rId6"/>
+    <p:sldId id="264" r:id="rId7"/>
+    <p:sldId id="266" r:id="rId8"/>
+    <p:sldId id="265" r:id="rId9"/>
+    <p:sldId id="262" r:id="rId10"/>
+    <p:sldId id="267" r:id="rId11"/>
+    <p:sldId id="268" r:id="rId12"/>
+    <p:sldId id="269" r:id="rId13"/>
+    <p:sldId id="270" r:id="rId14"/>
+    <p:sldId id="271" r:id="rId15"/>
   </p:sldIdLst>
   <p:sldSz cx="12192000" cy="6858000"/>
   <p:notesSz cx="6858000" cy="9144000"/>
@@ -264,7 +272,7 @@
           <a:p>
             <a:fld id="{8B486556-BAA6-4A33-8291-E7DA3A4ED0F1}" type="datetimeFigureOut">
               <a:rPr lang="en-US" smtClean="0"/>
-              <a:t>9/20/2021</a:t>
+              <a:t>10/3/2021</a:t>
             </a:fld>
             <a:endParaRPr lang="en-US"/>
           </a:p>
@@ -462,7 +470,7 @@
           <a:p>
             <a:fld id="{8B486556-BAA6-4A33-8291-E7DA3A4ED0F1}" type="datetimeFigureOut">
               <a:rPr lang="en-US" smtClean="0"/>
-              <a:t>9/20/2021</a:t>
+              <a:t>10/3/2021</a:t>
             </a:fld>
             <a:endParaRPr lang="en-US"/>
           </a:p>
@@ -670,7 +678,7 @@
           <a:p>
             <a:fld id="{8B486556-BAA6-4A33-8291-E7DA3A4ED0F1}" type="datetimeFigureOut">
               <a:rPr lang="en-US" smtClean="0"/>
-              <a:t>9/20/2021</a:t>
+              <a:t>10/3/2021</a:t>
             </a:fld>
             <a:endParaRPr lang="en-US"/>
           </a:p>
@@ -868,7 +876,7 @@
           <a:p>
             <a:fld id="{8B486556-BAA6-4A33-8291-E7DA3A4ED0F1}" type="datetimeFigureOut">
               <a:rPr lang="en-US" smtClean="0"/>
-              <a:t>9/20/2021</a:t>
+              <a:t>10/3/2021</a:t>
             </a:fld>
             <a:endParaRPr lang="en-US"/>
           </a:p>
@@ -1143,7 +1151,7 @@
           <a:p>
             <a:fld id="{8B486556-BAA6-4A33-8291-E7DA3A4ED0F1}" type="datetimeFigureOut">
               <a:rPr lang="en-US" smtClean="0"/>
-              <a:t>9/20/2021</a:t>
+              <a:t>10/3/2021</a:t>
             </a:fld>
             <a:endParaRPr lang="en-US"/>
           </a:p>
@@ -1408,7 +1416,7 @@
           <a:p>
             <a:fld id="{8B486556-BAA6-4A33-8291-E7DA3A4ED0F1}" type="datetimeFigureOut">
               <a:rPr lang="en-US" smtClean="0"/>
-              <a:t>9/20/2021</a:t>
+              <a:t>10/3/2021</a:t>
             </a:fld>
             <a:endParaRPr lang="en-US"/>
           </a:p>
@@ -1820,7 +1828,7 @@
           <a:p>
             <a:fld id="{8B486556-BAA6-4A33-8291-E7DA3A4ED0F1}" type="datetimeFigureOut">
               <a:rPr lang="en-US" smtClean="0"/>
-              <a:t>9/20/2021</a:t>
+              <a:t>10/3/2021</a:t>
             </a:fld>
             <a:endParaRPr lang="en-US"/>
           </a:p>
@@ -1961,7 +1969,7 @@
           <a:p>
             <a:fld id="{8B486556-BAA6-4A33-8291-E7DA3A4ED0F1}" type="datetimeFigureOut">
               <a:rPr lang="en-US" smtClean="0"/>
-              <a:t>9/20/2021</a:t>
+              <a:t>10/3/2021</a:t>
             </a:fld>
             <a:endParaRPr lang="en-US"/>
           </a:p>
@@ -2074,7 +2082,7 @@
           <a:p>
             <a:fld id="{8B486556-BAA6-4A33-8291-E7DA3A4ED0F1}" type="datetimeFigureOut">
               <a:rPr lang="en-US" smtClean="0"/>
-              <a:t>9/20/2021</a:t>
+              <a:t>10/3/2021</a:t>
             </a:fld>
             <a:endParaRPr lang="en-US"/>
           </a:p>
@@ -2385,7 +2393,7 @@
           <a:p>
             <a:fld id="{8B486556-BAA6-4A33-8291-E7DA3A4ED0F1}" type="datetimeFigureOut">
               <a:rPr lang="en-US" smtClean="0"/>
-              <a:t>9/20/2021</a:t>
+              <a:t>10/3/2021</a:t>
             </a:fld>
             <a:endParaRPr lang="en-US"/>
           </a:p>
@@ -2673,7 +2681,7 @@
           <a:p>
             <a:fld id="{8B486556-BAA6-4A33-8291-E7DA3A4ED0F1}" type="datetimeFigureOut">
               <a:rPr lang="en-US" smtClean="0"/>
-              <a:t>9/20/2021</a:t>
+              <a:t>10/3/2021</a:t>
             </a:fld>
             <a:endParaRPr lang="en-US"/>
           </a:p>
@@ -2914,7 +2922,7 @@
           <a:p>
             <a:fld id="{8B486556-BAA6-4A33-8291-E7DA3A4ED0F1}" type="datetimeFigureOut">
               <a:rPr lang="en-US" smtClean="0"/>
-              <a:t>9/20/2021</a:t>
+              <a:t>10/3/2021</a:t>
             </a:fld>
             <a:endParaRPr lang="en-US"/>
           </a:p>
@@ -3442,6 +3450,666 @@
 </p:sld>
 </file>
 
+<file path=ppt/slides/slide10.xml><?xml version="1.0" encoding="utf-8"?>
+<p:sld xmlns:a="http://schemas.openxmlformats.org/drawingml/2006/main" xmlns:r="http://schemas.openxmlformats.org/officeDocument/2006/relationships" xmlns:p="http://schemas.openxmlformats.org/presentationml/2006/main">
+  <p:cSld>
+    <p:spTree>
+      <p:nvGrpSpPr>
+        <p:cNvPr id="1" name=""/>
+        <p:cNvGrpSpPr/>
+        <p:nvPr/>
+      </p:nvGrpSpPr>
+      <p:grpSpPr>
+        <a:xfrm>
+          <a:off x="0" y="0"/>
+          <a:ext cx="0" cy="0"/>
+          <a:chOff x="0" y="0"/>
+          <a:chExt cx="0" cy="0"/>
+        </a:xfrm>
+      </p:grpSpPr>
+      <p:sp>
+        <p:nvSpPr>
+          <p:cNvPr id="2" name="Title 1">
+            <a:extLst>
+              <a:ext uri="{FF2B5EF4-FFF2-40B4-BE49-F238E27FC236}">
+                <a16:creationId xmlns:a16="http://schemas.microsoft.com/office/drawing/2014/main" id="{8BF67AB4-FB53-4D08-B180-90FB0D9AAB8C}"/>
+              </a:ext>
+            </a:extLst>
+          </p:cNvPr>
+          <p:cNvSpPr>
+            <a:spLocks noGrp="1"/>
+          </p:cNvSpPr>
+          <p:nvPr>
+            <p:ph type="title"/>
+          </p:nvPr>
+        </p:nvSpPr>
+        <p:spPr>
+          <a:xfrm>
+            <a:off x="1228436" y="184727"/>
+            <a:ext cx="10125364" cy="738909"/>
+          </a:xfrm>
+        </p:spPr>
+        <p:txBody>
+          <a:bodyPr/>
+          <a:lstStyle/>
+          <a:p>
+            <a:r>
+              <a:rPr lang="en-US" dirty="0"/>
+              <a:t>Mimic server </a:t>
+            </a:r>
+          </a:p>
+        </p:txBody>
+      </p:sp>
+      <p:pic>
+        <p:nvPicPr>
+          <p:cNvPr id="5" name="Content Placeholder 4">
+            <a:extLst>
+              <a:ext uri="{FF2B5EF4-FFF2-40B4-BE49-F238E27FC236}">
+                <a16:creationId xmlns:a16="http://schemas.microsoft.com/office/drawing/2014/main" id="{697F5564-2159-4FE1-93B6-3BD788BCE50F}"/>
+              </a:ext>
+            </a:extLst>
+          </p:cNvPr>
+          <p:cNvPicPr>
+            <a:picLocks noGrp="1" noChangeAspect="1"/>
+          </p:cNvPicPr>
+          <p:nvPr>
+            <p:ph idx="1"/>
+          </p:nvPr>
+        </p:nvPicPr>
+        <p:blipFill>
+          <a:blip r:embed="rId2"/>
+          <a:stretch>
+            <a:fillRect/>
+          </a:stretch>
+        </p:blipFill>
+        <p:spPr>
+          <a:xfrm>
+            <a:off x="671945" y="1027906"/>
+            <a:ext cx="10515600" cy="3298561"/>
+          </a:xfrm>
+        </p:spPr>
+      </p:pic>
+      <p:sp>
+        <p:nvSpPr>
+          <p:cNvPr id="10" name="TextBox 9">
+            <a:extLst>
+              <a:ext uri="{FF2B5EF4-FFF2-40B4-BE49-F238E27FC236}">
+                <a16:creationId xmlns:a16="http://schemas.microsoft.com/office/drawing/2014/main" id="{86E0E6BB-C878-4578-AF9F-D69BE051CCCF}"/>
+              </a:ext>
+            </a:extLst>
+          </p:cNvPr>
+          <p:cNvSpPr txBox="1"/>
+          <p:nvPr/>
+        </p:nvSpPr>
+        <p:spPr>
+          <a:xfrm>
+            <a:off x="406400" y="5292436"/>
+            <a:ext cx="2290618" cy="646331"/>
+          </a:xfrm>
+          <a:prstGeom prst="rect">
+            <a:avLst/>
+          </a:prstGeom>
+          <a:noFill/>
+        </p:spPr>
+        <p:txBody>
+          <a:bodyPr wrap="square" rtlCol="0">
+            <a:spAutoFit/>
+          </a:bodyPr>
+          <a:lstStyle/>
+          <a:p>
+            <a:r>
+              <a:rPr lang="en-US" dirty="0"/>
+              <a:t>Java call the server to complete the task</a:t>
+            </a:r>
+          </a:p>
+        </p:txBody>
+      </p:sp>
+      <p:pic>
+        <p:nvPicPr>
+          <p:cNvPr id="12" name="Picture 11">
+            <a:extLst>
+              <a:ext uri="{FF2B5EF4-FFF2-40B4-BE49-F238E27FC236}">
+                <a16:creationId xmlns:a16="http://schemas.microsoft.com/office/drawing/2014/main" id="{1AC677BE-EB21-42BF-BA4D-C8A62883783E}"/>
+              </a:ext>
+            </a:extLst>
+          </p:cNvPr>
+          <p:cNvPicPr>
+            <a:picLocks noChangeAspect="1"/>
+          </p:cNvPicPr>
+          <p:nvPr/>
+        </p:nvPicPr>
+        <p:blipFill>
+          <a:blip r:embed="rId3"/>
+          <a:stretch>
+            <a:fillRect/>
+          </a:stretch>
+        </p:blipFill>
+        <p:spPr>
+          <a:xfrm>
+            <a:off x="4546179" y="3414039"/>
+            <a:ext cx="5391150" cy="2790825"/>
+          </a:xfrm>
+          <a:prstGeom prst="rect">
+            <a:avLst/>
+          </a:prstGeom>
+        </p:spPr>
+      </p:pic>
+      <p:cxnSp>
+        <p:nvCxnSpPr>
+          <p:cNvPr id="16" name="Straight Arrow Connector 15">
+            <a:extLst>
+              <a:ext uri="{FF2B5EF4-FFF2-40B4-BE49-F238E27FC236}">
+                <a16:creationId xmlns:a16="http://schemas.microsoft.com/office/drawing/2014/main" id="{B62FDA9E-0B51-403B-9CA3-F7DCDFBEFA69}"/>
+              </a:ext>
+            </a:extLst>
+          </p:cNvPr>
+          <p:cNvCxnSpPr/>
+          <p:nvPr/>
+        </p:nvCxnSpPr>
+        <p:spPr>
+          <a:xfrm>
+            <a:off x="2544896" y="5615601"/>
+            <a:ext cx="2655065" cy="0"/>
+          </a:xfrm>
+          <a:prstGeom prst="straightConnector1">
+            <a:avLst/>
+          </a:prstGeom>
+          <a:ln>
+            <a:tailEnd type="triangle"/>
+          </a:ln>
+        </p:spPr>
+        <p:style>
+          <a:lnRef idx="1">
+            <a:schemeClr val="accent1"/>
+          </a:lnRef>
+          <a:fillRef idx="0">
+            <a:schemeClr val="accent1"/>
+          </a:fillRef>
+          <a:effectRef idx="0">
+            <a:schemeClr val="accent1"/>
+          </a:effectRef>
+          <a:fontRef idx="minor">
+            <a:schemeClr val="tx1"/>
+          </a:fontRef>
+        </p:style>
+      </p:cxnSp>
+    </p:spTree>
+    <p:extLst>
+      <p:ext uri="{BB962C8B-B14F-4D97-AF65-F5344CB8AC3E}">
+        <p14:creationId xmlns:p14="http://schemas.microsoft.com/office/powerpoint/2010/main" val="1133205232"/>
+      </p:ext>
+    </p:extLst>
+  </p:cSld>
+  <p:clrMapOvr>
+    <a:masterClrMapping/>
+  </p:clrMapOvr>
+</p:sld>
+</file>
+
+<file path=ppt/slides/slide11.xml><?xml version="1.0" encoding="utf-8"?>
+<p:sld xmlns:a="http://schemas.openxmlformats.org/drawingml/2006/main" xmlns:r="http://schemas.openxmlformats.org/officeDocument/2006/relationships" xmlns:p="http://schemas.openxmlformats.org/presentationml/2006/main">
+  <p:cSld>
+    <p:spTree>
+      <p:nvGrpSpPr>
+        <p:cNvPr id="1" name=""/>
+        <p:cNvGrpSpPr/>
+        <p:nvPr/>
+      </p:nvGrpSpPr>
+      <p:grpSpPr>
+        <a:xfrm>
+          <a:off x="0" y="0"/>
+          <a:ext cx="0" cy="0"/>
+          <a:chOff x="0" y="0"/>
+          <a:chExt cx="0" cy="0"/>
+        </a:xfrm>
+      </p:grpSpPr>
+      <p:sp>
+        <p:nvSpPr>
+          <p:cNvPr id="2" name="Title 1">
+            <a:extLst>
+              <a:ext uri="{FF2B5EF4-FFF2-40B4-BE49-F238E27FC236}">
+                <a16:creationId xmlns:a16="http://schemas.microsoft.com/office/drawing/2014/main" id="{6E781DCA-8C8C-4C33-8029-188289F18076}"/>
+              </a:ext>
+            </a:extLst>
+          </p:cNvPr>
+          <p:cNvSpPr>
+            <a:spLocks noGrp="1"/>
+          </p:cNvSpPr>
+          <p:nvPr>
+            <p:ph type="title"/>
+          </p:nvPr>
+        </p:nvSpPr>
+        <p:spPr/>
+        <p:txBody>
+          <a:bodyPr/>
+          <a:lstStyle/>
+          <a:p>
+            <a:r>
+              <a:rPr lang="en-US" dirty="0"/>
+              <a:t>Add Mockito dependency</a:t>
+            </a:r>
+          </a:p>
+        </p:txBody>
+      </p:sp>
+      <p:pic>
+        <p:nvPicPr>
+          <p:cNvPr id="5" name="Content Placeholder 4">
+            <a:extLst>
+              <a:ext uri="{FF2B5EF4-FFF2-40B4-BE49-F238E27FC236}">
+                <a16:creationId xmlns:a16="http://schemas.microsoft.com/office/drawing/2014/main" id="{21B2E76A-2CE6-4C98-96AC-73ADE95B64BF}"/>
+              </a:ext>
+            </a:extLst>
+          </p:cNvPr>
+          <p:cNvPicPr>
+            <a:picLocks noGrp="1" noChangeAspect="1"/>
+          </p:cNvPicPr>
+          <p:nvPr>
+            <p:ph idx="1"/>
+          </p:nvPr>
+        </p:nvPicPr>
+        <p:blipFill>
+          <a:blip r:embed="rId2"/>
+          <a:stretch>
+            <a:fillRect/>
+          </a:stretch>
+        </p:blipFill>
+        <p:spPr>
+          <a:xfrm>
+            <a:off x="1829607" y="1788679"/>
+            <a:ext cx="5798823" cy="4351338"/>
+          </a:xfrm>
+        </p:spPr>
+      </p:pic>
+    </p:spTree>
+    <p:extLst>
+      <p:ext uri="{BB962C8B-B14F-4D97-AF65-F5344CB8AC3E}">
+        <p14:creationId xmlns:p14="http://schemas.microsoft.com/office/powerpoint/2010/main" val="2563460600"/>
+      </p:ext>
+    </p:extLst>
+  </p:cSld>
+  <p:clrMapOvr>
+    <a:masterClrMapping/>
+  </p:clrMapOvr>
+</p:sld>
+</file>
+
+<file path=ppt/slides/slide12.xml><?xml version="1.0" encoding="utf-8"?>
+<p:sld xmlns:a="http://schemas.openxmlformats.org/drawingml/2006/main" xmlns:r="http://schemas.openxmlformats.org/officeDocument/2006/relationships" xmlns:p="http://schemas.openxmlformats.org/presentationml/2006/main">
+  <p:cSld>
+    <p:spTree>
+      <p:nvGrpSpPr>
+        <p:cNvPr id="1" name=""/>
+        <p:cNvGrpSpPr/>
+        <p:nvPr/>
+      </p:nvGrpSpPr>
+      <p:grpSpPr>
+        <a:xfrm>
+          <a:off x="0" y="0"/>
+          <a:ext cx="0" cy="0"/>
+          <a:chOff x="0" y="0"/>
+          <a:chExt cx="0" cy="0"/>
+        </a:xfrm>
+      </p:grpSpPr>
+      <p:sp>
+        <p:nvSpPr>
+          <p:cNvPr id="2" name="Title 1">
+            <a:extLst>
+              <a:ext uri="{FF2B5EF4-FFF2-40B4-BE49-F238E27FC236}">
+                <a16:creationId xmlns:a16="http://schemas.microsoft.com/office/drawing/2014/main" id="{3D42A234-A46E-4C8D-B7F8-A24D27694CC7}"/>
+              </a:ext>
+            </a:extLst>
+          </p:cNvPr>
+          <p:cNvSpPr>
+            <a:spLocks noGrp="1"/>
+          </p:cNvSpPr>
+          <p:nvPr>
+            <p:ph type="title"/>
+          </p:nvPr>
+        </p:nvSpPr>
+        <p:spPr>
+          <a:xfrm>
+            <a:off x="773545" y="-142875"/>
+            <a:ext cx="10515600" cy="1325563"/>
+          </a:xfrm>
+        </p:spPr>
+        <p:txBody>
+          <a:bodyPr/>
+          <a:lstStyle/>
+          <a:p>
+            <a:r>
+              <a:rPr lang="en-US" dirty="0"/>
+              <a:t>Update Mockito in java test case</a:t>
+            </a:r>
+          </a:p>
+        </p:txBody>
+      </p:sp>
+      <p:pic>
+        <p:nvPicPr>
+          <p:cNvPr id="9" name="Content Placeholder 8">
+            <a:extLst>
+              <a:ext uri="{FF2B5EF4-FFF2-40B4-BE49-F238E27FC236}">
+                <a16:creationId xmlns:a16="http://schemas.microsoft.com/office/drawing/2014/main" id="{2BABAABB-50F5-42E0-9801-0C789A73B69D}"/>
+              </a:ext>
+            </a:extLst>
+          </p:cNvPr>
+          <p:cNvPicPr>
+            <a:picLocks noGrp="1" noChangeAspect="1"/>
+          </p:cNvPicPr>
+          <p:nvPr>
+            <p:ph idx="1"/>
+          </p:nvPr>
+        </p:nvPicPr>
+        <p:blipFill>
+          <a:blip r:embed="rId2"/>
+          <a:stretch>
+            <a:fillRect/>
+          </a:stretch>
+        </p:blipFill>
+        <p:spPr>
+          <a:xfrm>
+            <a:off x="773545" y="831706"/>
+            <a:ext cx="5984728" cy="3213821"/>
+          </a:xfrm>
+        </p:spPr>
+      </p:pic>
+      <p:sp>
+        <p:nvSpPr>
+          <p:cNvPr id="10" name="TextBox 9">
+            <a:extLst>
+              <a:ext uri="{FF2B5EF4-FFF2-40B4-BE49-F238E27FC236}">
+                <a16:creationId xmlns:a16="http://schemas.microsoft.com/office/drawing/2014/main" id="{AC954655-E7C4-4EA8-8354-5F3BA54AAF6F}"/>
+              </a:ext>
+            </a:extLst>
+          </p:cNvPr>
+          <p:cNvSpPr txBox="1"/>
+          <p:nvPr/>
+        </p:nvSpPr>
+        <p:spPr>
+          <a:xfrm>
+            <a:off x="7583055" y="2438616"/>
+            <a:ext cx="2207490" cy="369332"/>
+          </a:xfrm>
+          <a:prstGeom prst="rect">
+            <a:avLst/>
+          </a:prstGeom>
+          <a:noFill/>
+        </p:spPr>
+        <p:txBody>
+          <a:bodyPr wrap="square" rtlCol="0">
+            <a:spAutoFit/>
+          </a:bodyPr>
+          <a:lstStyle/>
+          <a:p>
+            <a:r>
+              <a:rPr lang="en-US" dirty="0"/>
+              <a:t>OR</a:t>
+            </a:r>
+          </a:p>
+        </p:txBody>
+      </p:sp>
+      <p:pic>
+        <p:nvPicPr>
+          <p:cNvPr id="12" name="Picture 11">
+            <a:extLst>
+              <a:ext uri="{FF2B5EF4-FFF2-40B4-BE49-F238E27FC236}">
+                <a16:creationId xmlns:a16="http://schemas.microsoft.com/office/drawing/2014/main" id="{47078BDD-0378-45DD-B827-C8EC77E26881}"/>
+              </a:ext>
+            </a:extLst>
+          </p:cNvPr>
+          <p:cNvPicPr>
+            <a:picLocks noChangeAspect="1"/>
+          </p:cNvPicPr>
+          <p:nvPr/>
+        </p:nvPicPr>
+        <p:blipFill>
+          <a:blip r:embed="rId3"/>
+          <a:stretch>
+            <a:fillRect/>
+          </a:stretch>
+        </p:blipFill>
+        <p:spPr>
+          <a:xfrm>
+            <a:off x="5052292" y="3532291"/>
+            <a:ext cx="6816291" cy="3167535"/>
+          </a:xfrm>
+          <a:prstGeom prst="rect">
+            <a:avLst/>
+          </a:prstGeom>
+        </p:spPr>
+      </p:pic>
+    </p:spTree>
+    <p:extLst>
+      <p:ext uri="{BB962C8B-B14F-4D97-AF65-F5344CB8AC3E}">
+        <p14:creationId xmlns:p14="http://schemas.microsoft.com/office/powerpoint/2010/main" val="233193343"/>
+      </p:ext>
+    </p:extLst>
+  </p:cSld>
+  <p:clrMapOvr>
+    <a:masterClrMapping/>
+  </p:clrMapOvr>
+</p:sld>
+</file>
+
+<file path=ppt/slides/slide13.xml><?xml version="1.0" encoding="utf-8"?>
+<p:sld xmlns:a="http://schemas.openxmlformats.org/drawingml/2006/main" xmlns:r="http://schemas.openxmlformats.org/officeDocument/2006/relationships" xmlns:p="http://schemas.openxmlformats.org/presentationml/2006/main">
+  <p:cSld>
+    <p:spTree>
+      <p:nvGrpSpPr>
+        <p:cNvPr id="1" name=""/>
+        <p:cNvGrpSpPr/>
+        <p:nvPr/>
+      </p:nvGrpSpPr>
+      <p:grpSpPr>
+        <a:xfrm>
+          <a:off x="0" y="0"/>
+          <a:ext cx="0" cy="0"/>
+          <a:chOff x="0" y="0"/>
+          <a:chExt cx="0" cy="0"/>
+        </a:xfrm>
+      </p:grpSpPr>
+      <p:pic>
+        <p:nvPicPr>
+          <p:cNvPr id="5" name="Content Placeholder 4">
+            <a:extLst>
+              <a:ext uri="{FF2B5EF4-FFF2-40B4-BE49-F238E27FC236}">
+                <a16:creationId xmlns:a16="http://schemas.microsoft.com/office/drawing/2014/main" id="{AADDD397-2C74-4535-83CF-E36DB86F3E64}"/>
+              </a:ext>
+            </a:extLst>
+          </p:cNvPr>
+          <p:cNvPicPr>
+            <a:picLocks noGrp="1" noChangeAspect="1"/>
+          </p:cNvPicPr>
+          <p:nvPr>
+            <p:ph idx="1"/>
+          </p:nvPr>
+        </p:nvPicPr>
+        <p:blipFill>
+          <a:blip r:embed="rId2"/>
+          <a:stretch>
+            <a:fillRect/>
+          </a:stretch>
+        </p:blipFill>
+        <p:spPr>
+          <a:xfrm>
+            <a:off x="431081" y="653333"/>
+            <a:ext cx="8972227" cy="4351338"/>
+          </a:xfrm>
+        </p:spPr>
+      </p:pic>
+      <p:cxnSp>
+        <p:nvCxnSpPr>
+          <p:cNvPr id="7" name="Straight Arrow Connector 6">
+            <a:extLst>
+              <a:ext uri="{FF2B5EF4-FFF2-40B4-BE49-F238E27FC236}">
+                <a16:creationId xmlns:a16="http://schemas.microsoft.com/office/drawing/2014/main" id="{B4CD4D83-103C-4E21-AF70-B3F5ABB0BD66}"/>
+              </a:ext>
+            </a:extLst>
+          </p:cNvPr>
+          <p:cNvCxnSpPr/>
+          <p:nvPr/>
+        </p:nvCxnSpPr>
+        <p:spPr>
+          <a:xfrm>
+            <a:off x="6015210" y="3429000"/>
+            <a:ext cx="3161841" cy="1881130"/>
+          </a:xfrm>
+          <a:prstGeom prst="straightConnector1">
+            <a:avLst/>
+          </a:prstGeom>
+          <a:ln>
+            <a:tailEnd type="triangle"/>
+          </a:ln>
+        </p:spPr>
+        <p:style>
+          <a:lnRef idx="1">
+            <a:schemeClr val="accent1"/>
+          </a:lnRef>
+          <a:fillRef idx="0">
+            <a:schemeClr val="accent1"/>
+          </a:fillRef>
+          <a:effectRef idx="0">
+            <a:schemeClr val="accent1"/>
+          </a:effectRef>
+          <a:fontRef idx="minor">
+            <a:schemeClr val="tx1"/>
+          </a:fontRef>
+        </p:style>
+      </p:cxnSp>
+      <p:sp>
+        <p:nvSpPr>
+          <p:cNvPr id="8" name="TextBox 7">
+            <a:extLst>
+              <a:ext uri="{FF2B5EF4-FFF2-40B4-BE49-F238E27FC236}">
+                <a16:creationId xmlns:a16="http://schemas.microsoft.com/office/drawing/2014/main" id="{578CAE4B-A2C7-40F7-A0BD-FB237191C2C8}"/>
+              </a:ext>
+            </a:extLst>
+          </p:cNvPr>
+          <p:cNvSpPr txBox="1"/>
+          <p:nvPr/>
+        </p:nvSpPr>
+        <p:spPr>
+          <a:xfrm>
+            <a:off x="8692308" y="5508434"/>
+            <a:ext cx="2666082" cy="646331"/>
+          </a:xfrm>
+          <a:prstGeom prst="rect">
+            <a:avLst/>
+          </a:prstGeom>
+          <a:noFill/>
+        </p:spPr>
+        <p:txBody>
+          <a:bodyPr wrap="square" rtlCol="0">
+            <a:spAutoFit/>
+          </a:bodyPr>
+          <a:lstStyle/>
+          <a:p>
+            <a:r>
+              <a:rPr lang="en-US" dirty="0"/>
+              <a:t>Simulate the server execution</a:t>
+            </a:r>
+          </a:p>
+        </p:txBody>
+      </p:sp>
+    </p:spTree>
+    <p:extLst>
+      <p:ext uri="{BB962C8B-B14F-4D97-AF65-F5344CB8AC3E}">
+        <p14:creationId xmlns:p14="http://schemas.microsoft.com/office/powerpoint/2010/main" val="300788764"/>
+      </p:ext>
+    </p:extLst>
+  </p:cSld>
+  <p:clrMapOvr>
+    <a:masterClrMapping/>
+  </p:clrMapOvr>
+</p:sld>
+</file>
+
+<file path=ppt/slides/slide14.xml><?xml version="1.0" encoding="utf-8"?>
+<p:sld xmlns:a="http://schemas.openxmlformats.org/drawingml/2006/main" xmlns:r="http://schemas.openxmlformats.org/officeDocument/2006/relationships" xmlns:p="http://schemas.openxmlformats.org/presentationml/2006/main">
+  <p:cSld>
+    <p:spTree>
+      <p:nvGrpSpPr>
+        <p:cNvPr id="1" name=""/>
+        <p:cNvGrpSpPr/>
+        <p:nvPr/>
+      </p:nvGrpSpPr>
+      <p:grpSpPr>
+        <a:xfrm>
+          <a:off x="0" y="0"/>
+          <a:ext cx="0" cy="0"/>
+          <a:chOff x="0" y="0"/>
+          <a:chExt cx="0" cy="0"/>
+        </a:xfrm>
+      </p:grpSpPr>
+      <p:sp>
+        <p:nvSpPr>
+          <p:cNvPr id="2" name="Title 1">
+            <a:extLst>
+              <a:ext uri="{FF2B5EF4-FFF2-40B4-BE49-F238E27FC236}">
+                <a16:creationId xmlns:a16="http://schemas.microsoft.com/office/drawing/2014/main" id="{B08EBE13-7585-4D06-9680-3C6700935078}"/>
+              </a:ext>
+            </a:extLst>
+          </p:cNvPr>
+          <p:cNvSpPr>
+            <a:spLocks noGrp="1"/>
+          </p:cNvSpPr>
+          <p:nvPr>
+            <p:ph type="title"/>
+          </p:nvPr>
+        </p:nvSpPr>
+        <p:spPr/>
+        <p:txBody>
+          <a:bodyPr/>
+          <a:lstStyle/>
+          <a:p>
+            <a:r>
+              <a:rPr lang="en-US" dirty="0"/>
+              <a:t>Verify really calling the server</a:t>
+            </a:r>
+          </a:p>
+        </p:txBody>
+      </p:sp>
+      <p:pic>
+        <p:nvPicPr>
+          <p:cNvPr id="5" name="Content Placeholder 4">
+            <a:extLst>
+              <a:ext uri="{FF2B5EF4-FFF2-40B4-BE49-F238E27FC236}">
+                <a16:creationId xmlns:a16="http://schemas.microsoft.com/office/drawing/2014/main" id="{313440D2-18EB-49F5-A220-B474C6CE897A}"/>
+              </a:ext>
+            </a:extLst>
+          </p:cNvPr>
+          <p:cNvPicPr>
+            <a:picLocks noGrp="1" noChangeAspect="1"/>
+          </p:cNvPicPr>
+          <p:nvPr>
+            <p:ph idx="1"/>
+          </p:nvPr>
+        </p:nvPicPr>
+        <p:blipFill>
+          <a:blip r:embed="rId2"/>
+          <a:stretch>
+            <a:fillRect/>
+          </a:stretch>
+        </p:blipFill>
+        <p:spPr>
+          <a:xfrm>
+            <a:off x="1182480" y="1825625"/>
+            <a:ext cx="7821970" cy="4351338"/>
+          </a:xfrm>
+        </p:spPr>
+      </p:pic>
+    </p:spTree>
+    <p:extLst>
+      <p:ext uri="{BB962C8B-B14F-4D97-AF65-F5344CB8AC3E}">
+        <p14:creationId xmlns:p14="http://schemas.microsoft.com/office/powerpoint/2010/main" val="1337789533"/>
+      </p:ext>
+    </p:extLst>
+  </p:cSld>
+  <p:clrMapOvr>
+    <a:masterClrMapping/>
+  </p:clrMapOvr>
+</p:sld>
+</file>
+
 <file path=ppt/slides/slide2.xml><?xml version="1.0" encoding="utf-8"?>
 <p:sld xmlns:a="http://schemas.openxmlformats.org/drawingml/2006/main" xmlns:r="http://schemas.openxmlformats.org/officeDocument/2006/relationships" xmlns:p="http://schemas.openxmlformats.org/presentationml/2006/main">
   <p:cSld>
@@ -3836,7 +4504,7 @@
           <p:cNvPr id="2" name="Title 1">
             <a:extLst>
               <a:ext uri="{FF2B5EF4-FFF2-40B4-BE49-F238E27FC236}">
-                <a16:creationId xmlns:a16="http://schemas.microsoft.com/office/drawing/2014/main" id="{06D8B7F0-A022-42BF-853A-EABB6BF6A88B}"/>
+                <a16:creationId xmlns:a16="http://schemas.microsoft.com/office/drawing/2014/main" id="{FF2A2B5A-1158-4246-A876-7534078F83BA}"/>
               </a:ext>
             </a:extLst>
           </p:cNvPr>
@@ -3847,29 +4515,24 @@
             <p:ph type="title"/>
           </p:nvPr>
         </p:nvSpPr>
-        <p:spPr>
-          <a:xfrm>
-            <a:off x="838200" y="66545"/>
-            <a:ext cx="10515600" cy="1325563"/>
-          </a:xfrm>
-        </p:spPr>
+        <p:spPr/>
         <p:txBody>
           <a:bodyPr/>
           <a:lstStyle/>
           <a:p>
             <a:r>
               <a:rPr lang="en-US" dirty="0"/>
-              <a:t>How to create test class</a:t>
+              <a:t>Create java script under main/java</a:t>
             </a:r>
           </a:p>
         </p:txBody>
       </p:sp>
       <p:pic>
         <p:nvPicPr>
-          <p:cNvPr id="5" name="Content Placeholder 4">
-            <a:extLst>
-              <a:ext uri="{FF2B5EF4-FFF2-40B4-BE49-F238E27FC236}">
-                <a16:creationId xmlns:a16="http://schemas.microsoft.com/office/drawing/2014/main" id="{6D8CEFAD-7F9E-46C3-AE5E-6FC1BB4DB19D}"/>
+          <p:cNvPr id="13" name="Content Placeholder 12">
+            <a:extLst>
+              <a:ext uri="{FF2B5EF4-FFF2-40B4-BE49-F238E27FC236}">
+                <a16:creationId xmlns:a16="http://schemas.microsoft.com/office/drawing/2014/main" id="{7BF28F6D-212F-4BBB-9C71-379392291689}"/>
               </a:ext>
             </a:extLst>
           </p:cNvPr>
@@ -3888,50 +4551,15 @@
         </p:blipFill>
         <p:spPr>
           <a:xfrm>
-            <a:off x="1052944" y="2550396"/>
-            <a:ext cx="7266521" cy="3755875"/>
+            <a:off x="1098387" y="1690688"/>
+            <a:ext cx="8474898" cy="4351338"/>
           </a:xfrm>
         </p:spPr>
       </p:pic>
-      <p:sp>
-        <p:nvSpPr>
-          <p:cNvPr id="6" name="TextBox 5">
-            <a:extLst>
-              <a:ext uri="{FF2B5EF4-FFF2-40B4-BE49-F238E27FC236}">
-                <a16:creationId xmlns:a16="http://schemas.microsoft.com/office/drawing/2014/main" id="{FD9DBA82-1999-475B-A194-7C22B0C4FDA8}"/>
-              </a:ext>
-            </a:extLst>
-          </p:cNvPr>
-          <p:cNvSpPr txBox="1"/>
-          <p:nvPr/>
-        </p:nvSpPr>
-        <p:spPr>
-          <a:xfrm>
-            <a:off x="838200" y="1392108"/>
-            <a:ext cx="5414818" cy="646331"/>
-          </a:xfrm>
-          <a:prstGeom prst="rect">
-            <a:avLst/>
-          </a:prstGeom>
-          <a:noFill/>
-        </p:spPr>
-        <p:txBody>
-          <a:bodyPr wrap="square" rtlCol="0">
-            <a:spAutoFit/>
-          </a:bodyPr>
-          <a:lstStyle/>
-          <a:p>
-            <a:r>
-              <a:rPr lang="en-US" dirty="0"/>
-              <a:t>Reference link :https://www.youtube.com/watch?v=o5pE7L2tVV8</a:t>
-            </a:r>
-          </a:p>
-        </p:txBody>
-      </p:sp>
     </p:spTree>
     <p:extLst>
       <p:ext uri="{BB962C8B-B14F-4D97-AF65-F5344CB8AC3E}">
-        <p14:creationId xmlns:p14="http://schemas.microsoft.com/office/powerpoint/2010/main" val="3680631833"/>
+        <p14:creationId xmlns:p14="http://schemas.microsoft.com/office/powerpoint/2010/main" val="2028758674"/>
       </p:ext>
     </p:extLst>
   </p:cSld>
@@ -3963,7 +4591,7 @@
           <p:cNvPr id="2" name="Title 1">
             <a:extLst>
               <a:ext uri="{FF2B5EF4-FFF2-40B4-BE49-F238E27FC236}">
-                <a16:creationId xmlns:a16="http://schemas.microsoft.com/office/drawing/2014/main" id="{C72E0689-1252-4DB7-AE97-900C8E221B11}"/>
+                <a16:creationId xmlns:a16="http://schemas.microsoft.com/office/drawing/2014/main" id="{B9737F45-F3F1-4DC1-9362-13AF8099B3CB}"/>
               </a:ext>
             </a:extLst>
           </p:cNvPr>
@@ -3974,24 +4602,29 @@
             <p:ph type="title"/>
           </p:nvPr>
         </p:nvSpPr>
-        <p:spPr/>
+        <p:spPr>
+          <a:xfrm>
+            <a:off x="430576" y="0"/>
+            <a:ext cx="10515600" cy="1325563"/>
+          </a:xfrm>
+        </p:spPr>
         <p:txBody>
           <a:bodyPr/>
           <a:lstStyle/>
           <a:p>
             <a:r>
               <a:rPr lang="en-US" dirty="0"/>
-              <a:t>Create testcase</a:t>
+              <a:t>Create testcase (right click package name and  create testcase)</a:t>
             </a:r>
           </a:p>
         </p:txBody>
       </p:sp>
       <p:pic>
         <p:nvPicPr>
-          <p:cNvPr id="5" name="Content Placeholder 4">
-            <a:extLst>
-              <a:ext uri="{FF2B5EF4-FFF2-40B4-BE49-F238E27FC236}">
-                <a16:creationId xmlns:a16="http://schemas.microsoft.com/office/drawing/2014/main" id="{2424C933-4C3B-4C4B-A0DB-69BBEB37C07A}"/>
+          <p:cNvPr id="9" name="Content Placeholder 8">
+            <a:extLst>
+              <a:ext uri="{FF2B5EF4-FFF2-40B4-BE49-F238E27FC236}">
+                <a16:creationId xmlns:a16="http://schemas.microsoft.com/office/drawing/2014/main" id="{446078E7-528E-4EFB-BC71-BF0A2833CAAF}"/>
               </a:ext>
             </a:extLst>
           </p:cNvPr>
@@ -4010,15 +4643,329 @@
         </p:blipFill>
         <p:spPr>
           <a:xfrm>
-            <a:off x="1881079" y="1825625"/>
-            <a:ext cx="8429842" cy="4351338"/>
+            <a:off x="1159848" y="1913760"/>
+            <a:ext cx="7955369" cy="4351338"/>
           </a:xfrm>
         </p:spPr>
       </p:pic>
     </p:spTree>
     <p:extLst>
       <p:ext uri="{BB962C8B-B14F-4D97-AF65-F5344CB8AC3E}">
-        <p14:creationId xmlns:p14="http://schemas.microsoft.com/office/powerpoint/2010/main" val="3315407821"/>
+        <p14:creationId xmlns:p14="http://schemas.microsoft.com/office/powerpoint/2010/main" val="781238150"/>
+      </p:ext>
+    </p:extLst>
+  </p:cSld>
+  <p:clrMapOvr>
+    <a:masterClrMapping/>
+  </p:clrMapOvr>
+</p:sld>
+</file>
+
+<file path=ppt/slides/slide7.xml><?xml version="1.0" encoding="utf-8"?>
+<p:sld xmlns:a="http://schemas.openxmlformats.org/drawingml/2006/main" xmlns:r="http://schemas.openxmlformats.org/officeDocument/2006/relationships" xmlns:p="http://schemas.openxmlformats.org/presentationml/2006/main">
+  <p:cSld>
+    <p:spTree>
+      <p:nvGrpSpPr>
+        <p:cNvPr id="1" name=""/>
+        <p:cNvGrpSpPr/>
+        <p:nvPr/>
+      </p:nvGrpSpPr>
+      <p:grpSpPr>
+        <a:xfrm>
+          <a:off x="0" y="0"/>
+          <a:ext cx="0" cy="0"/>
+          <a:chOff x="0" y="0"/>
+          <a:chExt cx="0" cy="0"/>
+        </a:xfrm>
+      </p:grpSpPr>
+      <p:sp>
+        <p:nvSpPr>
+          <p:cNvPr id="2" name="Title 1">
+            <a:extLst>
+              <a:ext uri="{FF2B5EF4-FFF2-40B4-BE49-F238E27FC236}">
+                <a16:creationId xmlns:a16="http://schemas.microsoft.com/office/drawing/2014/main" id="{AE18BB7E-C734-47C2-8319-3824A42DB343}"/>
+              </a:ext>
+            </a:extLst>
+          </p:cNvPr>
+          <p:cNvSpPr>
+            <a:spLocks noGrp="1"/>
+          </p:cNvSpPr>
+          <p:nvPr>
+            <p:ph type="title"/>
+          </p:nvPr>
+        </p:nvSpPr>
+        <p:spPr/>
+        <p:txBody>
+          <a:bodyPr/>
+          <a:lstStyle/>
+          <a:p>
+            <a:r>
+              <a:rPr lang="en-US" dirty="0"/>
+              <a:t>Update testcase </a:t>
+            </a:r>
+          </a:p>
+        </p:txBody>
+      </p:sp>
+      <p:pic>
+        <p:nvPicPr>
+          <p:cNvPr id="23" name="Content Placeholder 22">
+            <a:extLst>
+              <a:ext uri="{FF2B5EF4-FFF2-40B4-BE49-F238E27FC236}">
+                <a16:creationId xmlns:a16="http://schemas.microsoft.com/office/drawing/2014/main" id="{E6A4A51C-AEC8-4964-9F6C-FFA68BFB8F56}"/>
+              </a:ext>
+            </a:extLst>
+          </p:cNvPr>
+          <p:cNvPicPr>
+            <a:picLocks noGrp="1" noChangeAspect="1"/>
+          </p:cNvPicPr>
+          <p:nvPr>
+            <p:ph idx="1"/>
+          </p:nvPr>
+        </p:nvPicPr>
+        <p:blipFill>
+          <a:blip r:embed="rId2"/>
+          <a:stretch>
+            <a:fillRect/>
+          </a:stretch>
+        </p:blipFill>
+        <p:spPr>
+          <a:xfrm>
+            <a:off x="1123631" y="1594271"/>
+            <a:ext cx="8093903" cy="4351338"/>
+          </a:xfrm>
+        </p:spPr>
+      </p:pic>
+    </p:spTree>
+    <p:extLst>
+      <p:ext uri="{BB962C8B-B14F-4D97-AF65-F5344CB8AC3E}">
+        <p14:creationId xmlns:p14="http://schemas.microsoft.com/office/powerpoint/2010/main" val="2431154509"/>
+      </p:ext>
+    </p:extLst>
+  </p:cSld>
+  <p:clrMapOvr>
+    <a:masterClrMapping/>
+  </p:clrMapOvr>
+</p:sld>
+</file>
+
+<file path=ppt/slides/slide8.xml><?xml version="1.0" encoding="utf-8"?>
+<p:sld xmlns:a="http://schemas.openxmlformats.org/drawingml/2006/main" xmlns:r="http://schemas.openxmlformats.org/officeDocument/2006/relationships" xmlns:p="http://schemas.openxmlformats.org/presentationml/2006/main">
+  <p:cSld>
+    <p:spTree>
+      <p:nvGrpSpPr>
+        <p:cNvPr id="1" name=""/>
+        <p:cNvGrpSpPr/>
+        <p:nvPr/>
+      </p:nvGrpSpPr>
+      <p:grpSpPr>
+        <a:xfrm>
+          <a:off x="0" y="0"/>
+          <a:ext cx="0" cy="0"/>
+          <a:chOff x="0" y="0"/>
+          <a:chExt cx="0" cy="0"/>
+        </a:xfrm>
+      </p:grpSpPr>
+      <p:sp>
+        <p:nvSpPr>
+          <p:cNvPr id="2" name="Title 1">
+            <a:extLst>
+              <a:ext uri="{FF2B5EF4-FFF2-40B4-BE49-F238E27FC236}">
+                <a16:creationId xmlns:a16="http://schemas.microsoft.com/office/drawing/2014/main" id="{FEAC7CA3-E1A9-4B2B-992D-E45F8B11B63C}"/>
+              </a:ext>
+            </a:extLst>
+          </p:cNvPr>
+          <p:cNvSpPr>
+            <a:spLocks noGrp="1"/>
+          </p:cNvSpPr>
+          <p:nvPr>
+            <p:ph type="title"/>
+          </p:nvPr>
+        </p:nvSpPr>
+        <p:spPr/>
+        <p:txBody>
+          <a:bodyPr/>
+          <a:lstStyle/>
+          <a:p>
+            <a:r>
+              <a:rPr lang="en-US" dirty="0"/>
+              <a:t>To test it </a:t>
+            </a:r>
+          </a:p>
+        </p:txBody>
+      </p:sp>
+      <p:sp>
+        <p:nvSpPr>
+          <p:cNvPr id="3" name="Content Placeholder 2">
+            <a:extLst>
+              <a:ext uri="{FF2B5EF4-FFF2-40B4-BE49-F238E27FC236}">
+                <a16:creationId xmlns:a16="http://schemas.microsoft.com/office/drawing/2014/main" id="{F378E768-112E-4938-B32E-2866266023AF}"/>
+              </a:ext>
+            </a:extLst>
+          </p:cNvPr>
+          <p:cNvSpPr>
+            <a:spLocks noGrp="1"/>
+          </p:cNvSpPr>
+          <p:nvPr>
+            <p:ph idx="1"/>
+          </p:nvPr>
+        </p:nvSpPr>
+        <p:spPr>
+          <a:xfrm>
+            <a:off x="838200" y="1557771"/>
+            <a:ext cx="10515600" cy="4351338"/>
+          </a:xfrm>
+        </p:spPr>
+        <p:txBody>
+          <a:bodyPr/>
+          <a:lstStyle/>
+          <a:p>
+            <a:r>
+              <a:rPr lang="en-US" dirty="0"/>
+              <a:t>Right click “Run As”-&gt;”1 Junit Test”</a:t>
+            </a:r>
+          </a:p>
+          <a:p>
+            <a:endParaRPr lang="en-US" dirty="0"/>
+          </a:p>
+        </p:txBody>
+      </p:sp>
+      <p:pic>
+        <p:nvPicPr>
+          <p:cNvPr id="5" name="Picture 4">
+            <a:extLst>
+              <a:ext uri="{FF2B5EF4-FFF2-40B4-BE49-F238E27FC236}">
+                <a16:creationId xmlns:a16="http://schemas.microsoft.com/office/drawing/2014/main" id="{55F89E2E-9B3E-4E7B-830C-68B95A673D3B}"/>
+              </a:ext>
+            </a:extLst>
+          </p:cNvPr>
+          <p:cNvPicPr>
+            <a:picLocks noChangeAspect="1"/>
+          </p:cNvPicPr>
+          <p:nvPr/>
+        </p:nvPicPr>
+        <p:blipFill>
+          <a:blip r:embed="rId2"/>
+          <a:stretch>
+            <a:fillRect/>
+          </a:stretch>
+        </p:blipFill>
+        <p:spPr>
+          <a:xfrm>
+            <a:off x="838200" y="2228314"/>
+            <a:ext cx="8275782" cy="4348135"/>
+          </a:xfrm>
+          <a:prstGeom prst="rect">
+            <a:avLst/>
+          </a:prstGeom>
+        </p:spPr>
+      </p:pic>
+    </p:spTree>
+    <p:extLst>
+      <p:ext uri="{BB962C8B-B14F-4D97-AF65-F5344CB8AC3E}">
+        <p14:creationId xmlns:p14="http://schemas.microsoft.com/office/powerpoint/2010/main" val="2898015938"/>
+      </p:ext>
+    </p:extLst>
+  </p:cSld>
+  <p:clrMapOvr>
+    <a:masterClrMapping/>
+  </p:clrMapOvr>
+</p:sld>
+</file>
+
+<file path=ppt/slides/slide9.xml><?xml version="1.0" encoding="utf-8"?>
+<p:sld xmlns:a="http://schemas.openxmlformats.org/drawingml/2006/main" xmlns:r="http://schemas.openxmlformats.org/officeDocument/2006/relationships" xmlns:p="http://schemas.openxmlformats.org/presentationml/2006/main">
+  <p:cSld>
+    <p:spTree>
+      <p:nvGrpSpPr>
+        <p:cNvPr id="1" name=""/>
+        <p:cNvGrpSpPr/>
+        <p:nvPr/>
+      </p:nvGrpSpPr>
+      <p:grpSpPr>
+        <a:xfrm>
+          <a:off x="0" y="0"/>
+          <a:ext cx="0" cy="0"/>
+          <a:chOff x="0" y="0"/>
+          <a:chExt cx="0" cy="0"/>
+        </a:xfrm>
+      </p:grpSpPr>
+      <p:sp>
+        <p:nvSpPr>
+          <p:cNvPr id="2" name="Title 1">
+            <a:extLst>
+              <a:ext uri="{FF2B5EF4-FFF2-40B4-BE49-F238E27FC236}">
+                <a16:creationId xmlns:a16="http://schemas.microsoft.com/office/drawing/2014/main" id="{1E8F43C9-C051-454A-99E4-6BE26A375BBA}"/>
+              </a:ext>
+            </a:extLst>
+          </p:cNvPr>
+          <p:cNvSpPr>
+            <a:spLocks noGrp="1"/>
+          </p:cNvSpPr>
+          <p:nvPr>
+            <p:ph type="title"/>
+          </p:nvPr>
+        </p:nvSpPr>
+        <p:spPr/>
+        <p:txBody>
+          <a:bodyPr/>
+          <a:lstStyle/>
+          <a:p>
+            <a:r>
+              <a:rPr lang="en-US" dirty="0"/>
+              <a:t>Mockito</a:t>
+            </a:r>
+          </a:p>
+        </p:txBody>
+      </p:sp>
+      <p:sp>
+        <p:nvSpPr>
+          <p:cNvPr id="3" name="Content Placeholder 2">
+            <a:extLst>
+              <a:ext uri="{FF2B5EF4-FFF2-40B4-BE49-F238E27FC236}">
+                <a16:creationId xmlns:a16="http://schemas.microsoft.com/office/drawing/2014/main" id="{80812172-AC54-46D7-AEA2-23CE6C880E3B}"/>
+              </a:ext>
+            </a:extLst>
+          </p:cNvPr>
+          <p:cNvSpPr>
+            <a:spLocks noGrp="1"/>
+          </p:cNvSpPr>
+          <p:nvPr>
+            <p:ph idx="1"/>
+          </p:nvPr>
+        </p:nvSpPr>
+        <p:spPr/>
+        <p:txBody>
+          <a:bodyPr/>
+          <a:lstStyle/>
+          <a:p>
+            <a:r>
+              <a:rPr lang="en-US" dirty="0"/>
+              <a:t>Application -&gt; server </a:t>
+            </a:r>
+          </a:p>
+          <a:p>
+            <a:endParaRPr lang="en-US" dirty="0"/>
+          </a:p>
+          <a:p>
+            <a:r>
+              <a:rPr lang="en-US" dirty="0"/>
+              <a:t>Mockito is to simulate the server so that we only need to worry about the application testing (no need to test the server since server supplier </a:t>
+            </a:r>
+            <a:r>
+              <a:rPr lang="en-US" dirty="0" err="1"/>
+              <a:t>eg</a:t>
+            </a:r>
+            <a:r>
+              <a:rPr lang="en-US" dirty="0"/>
+              <a:t>, Google already done a through testing of it)</a:t>
+            </a:r>
+          </a:p>
+        </p:txBody>
+      </p:sp>
+    </p:spTree>
+    <p:extLst>
+      <p:ext uri="{BB962C8B-B14F-4D97-AF65-F5344CB8AC3E}">
+        <p14:creationId xmlns:p14="http://schemas.microsoft.com/office/powerpoint/2010/main" val="1464380155"/>
       </p:ext>
     </p:extLst>
   </p:cSld>

</xml_diff>